<commit_message>
Update naming of files
</commit_message>
<xml_diff>
--- a/Challenges/ChallengeWeekend.pptx
+++ b/Challenges/ChallengeWeekend.pptx
@@ -6,8 +6,9 @@
   </p:sldMasterIdLst>
   <p:sldIdLst>
     <p:sldId id="256" r:id="rId2"/>
-    <p:sldId id="257" r:id="rId3"/>
-    <p:sldId id="258" r:id="rId4"/>
+    <p:sldId id="259" r:id="rId3"/>
+    <p:sldId id="257" r:id="rId4"/>
+    <p:sldId id="258" r:id="rId5"/>
   </p:sldIdLst>
   <p:sldSz cx="12192000" cy="6858000"/>
   <p:notesSz cx="6858000" cy="9144000"/>
@@ -261,7 +262,7 @@
           <a:p>
             <a:fld id="{ABC8E487-C007-4F07-897B-FE84E52419A3}" type="datetimeFigureOut">
               <a:rPr lang="en-US" smtClean="0"/>
-              <a:t>12/7/2018</a:t>
+              <a:t>12/9/2018</a:t>
             </a:fld>
             <a:endParaRPr lang="en-US"/>
           </a:p>
@@ -459,7 +460,7 @@
           <a:p>
             <a:fld id="{ABC8E487-C007-4F07-897B-FE84E52419A3}" type="datetimeFigureOut">
               <a:rPr lang="en-US" smtClean="0"/>
-              <a:t>12/7/2018</a:t>
+              <a:t>12/9/2018</a:t>
             </a:fld>
             <a:endParaRPr lang="en-US"/>
           </a:p>
@@ -667,7 +668,7 @@
           <a:p>
             <a:fld id="{ABC8E487-C007-4F07-897B-FE84E52419A3}" type="datetimeFigureOut">
               <a:rPr lang="en-US" smtClean="0"/>
-              <a:t>12/7/2018</a:t>
+              <a:t>12/9/2018</a:t>
             </a:fld>
             <a:endParaRPr lang="en-US"/>
           </a:p>
@@ -865,7 +866,7 @@
           <a:p>
             <a:fld id="{ABC8E487-C007-4F07-897B-FE84E52419A3}" type="datetimeFigureOut">
               <a:rPr lang="en-US" smtClean="0"/>
-              <a:t>12/7/2018</a:t>
+              <a:t>12/9/2018</a:t>
             </a:fld>
             <a:endParaRPr lang="en-US"/>
           </a:p>
@@ -1140,7 +1141,7 @@
           <a:p>
             <a:fld id="{ABC8E487-C007-4F07-897B-FE84E52419A3}" type="datetimeFigureOut">
               <a:rPr lang="en-US" smtClean="0"/>
-              <a:t>12/7/2018</a:t>
+              <a:t>12/9/2018</a:t>
             </a:fld>
             <a:endParaRPr lang="en-US"/>
           </a:p>
@@ -1405,7 +1406,7 @@
           <a:p>
             <a:fld id="{ABC8E487-C007-4F07-897B-FE84E52419A3}" type="datetimeFigureOut">
               <a:rPr lang="en-US" smtClean="0"/>
-              <a:t>12/7/2018</a:t>
+              <a:t>12/9/2018</a:t>
             </a:fld>
             <a:endParaRPr lang="en-US"/>
           </a:p>
@@ -1817,7 +1818,7 @@
           <a:p>
             <a:fld id="{ABC8E487-C007-4F07-897B-FE84E52419A3}" type="datetimeFigureOut">
               <a:rPr lang="en-US" smtClean="0"/>
-              <a:t>12/7/2018</a:t>
+              <a:t>12/9/2018</a:t>
             </a:fld>
             <a:endParaRPr lang="en-US"/>
           </a:p>
@@ -1958,7 +1959,7 @@
           <a:p>
             <a:fld id="{ABC8E487-C007-4F07-897B-FE84E52419A3}" type="datetimeFigureOut">
               <a:rPr lang="en-US" smtClean="0"/>
-              <a:t>12/7/2018</a:t>
+              <a:t>12/9/2018</a:t>
             </a:fld>
             <a:endParaRPr lang="en-US"/>
           </a:p>
@@ -2071,7 +2072,7 @@
           <a:p>
             <a:fld id="{ABC8E487-C007-4F07-897B-FE84E52419A3}" type="datetimeFigureOut">
               <a:rPr lang="en-US" smtClean="0"/>
-              <a:t>12/7/2018</a:t>
+              <a:t>12/9/2018</a:t>
             </a:fld>
             <a:endParaRPr lang="en-US"/>
           </a:p>
@@ -2382,7 +2383,7 @@
           <a:p>
             <a:fld id="{ABC8E487-C007-4F07-897B-FE84E52419A3}" type="datetimeFigureOut">
               <a:rPr lang="en-US" smtClean="0"/>
-              <a:t>12/7/2018</a:t>
+              <a:t>12/9/2018</a:t>
             </a:fld>
             <a:endParaRPr lang="en-US"/>
           </a:p>
@@ -2670,7 +2671,7 @@
           <a:p>
             <a:fld id="{ABC8E487-C007-4F07-897B-FE84E52419A3}" type="datetimeFigureOut">
               <a:rPr lang="en-US" smtClean="0"/>
-              <a:t>12/7/2018</a:t>
+              <a:t>12/9/2018</a:t>
             </a:fld>
             <a:endParaRPr lang="en-US"/>
           </a:p>
@@ -2911,7 +2912,7 @@
           <a:p>
             <a:fld id="{ABC8E487-C007-4F07-897B-FE84E52419A3}" type="datetimeFigureOut">
               <a:rPr lang="en-US" smtClean="0"/>
-              <a:t>12/7/2018</a:t>
+              <a:t>12/9/2018</a:t>
             </a:fld>
             <a:endParaRPr lang="en-US"/>
           </a:p>
@@ -3414,7 +3415,7 @@
         </p:blipFill>
         <p:spPr>
           <a:xfrm>
-            <a:off x="0" y="5232400"/>
+            <a:off x="0" y="-9676"/>
             <a:ext cx="12192000" cy="1625600"/>
           </a:xfrm>
           <a:prstGeom prst="rect">
@@ -3457,6 +3458,130 @@
           <p:cNvPr id="2" name="Title 1">
             <a:extLst>
               <a:ext uri="{FF2B5EF4-FFF2-40B4-BE49-F238E27FC236}">
+                <a16:creationId xmlns:a16="http://schemas.microsoft.com/office/drawing/2014/main" id="{1A565BB6-904C-428B-B513-1B5403E96966}"/>
+              </a:ext>
+            </a:extLst>
+          </p:cNvPr>
+          <p:cNvSpPr>
+            <a:spLocks noGrp="1"/>
+          </p:cNvSpPr>
+          <p:nvPr>
+            <p:ph type="ctrTitle"/>
+          </p:nvPr>
+        </p:nvSpPr>
+        <p:spPr/>
+        <p:txBody>
+          <a:bodyPr/>
+          <a:lstStyle/>
+          <a:p>
+            <a:r>
+              <a:rPr lang="en-US" dirty="0"/>
+              <a:t>Welcome to the On-Campus Challenge Weekend</a:t>
+            </a:r>
+          </a:p>
+        </p:txBody>
+      </p:sp>
+      <p:sp>
+        <p:nvSpPr>
+          <p:cNvPr id="3" name="Subtitle 2">
+            <a:extLst>
+              <a:ext uri="{FF2B5EF4-FFF2-40B4-BE49-F238E27FC236}">
+                <a16:creationId xmlns:a16="http://schemas.microsoft.com/office/drawing/2014/main" id="{533A905C-8D84-412A-9E87-7037521BCF7A}"/>
+              </a:ext>
+            </a:extLst>
+          </p:cNvPr>
+          <p:cNvSpPr>
+            <a:spLocks noGrp="1"/>
+          </p:cNvSpPr>
+          <p:nvPr>
+            <p:ph type="subTitle" idx="1"/>
+          </p:nvPr>
+        </p:nvSpPr>
+        <p:spPr/>
+        <p:txBody>
+          <a:bodyPr>
+            <a:normAutofit/>
+          </a:bodyPr>
+          <a:lstStyle/>
+          <a:p>
+            <a:r>
+              <a:rPr lang="en-US" sz="3600" dirty="0"/>
+              <a:t>CSCI E-82A</a:t>
+            </a:r>
+          </a:p>
+        </p:txBody>
+      </p:sp>
+      <p:pic>
+        <p:nvPicPr>
+          <p:cNvPr id="4" name="Picture 3">
+            <a:extLst>
+              <a:ext uri="{FF2B5EF4-FFF2-40B4-BE49-F238E27FC236}">
+                <a16:creationId xmlns:a16="http://schemas.microsoft.com/office/drawing/2014/main" id="{E9117D95-B8CE-451B-91C6-EF962D65F3F1}"/>
+              </a:ext>
+            </a:extLst>
+          </p:cNvPr>
+          <p:cNvPicPr>
+            <a:picLocks noChangeAspect="1"/>
+          </p:cNvPicPr>
+          <p:nvPr/>
+        </p:nvPicPr>
+        <p:blipFill>
+          <a:blip r:embed="rId2">
+            <a:extLst>
+              <a:ext uri="{28A0092B-C50C-407E-A947-70E740481C1C}">
+                <a14:useLocalDpi xmlns:a14="http://schemas.microsoft.com/office/drawing/2010/main" val="0"/>
+              </a:ext>
+            </a:extLst>
+          </a:blip>
+          <a:stretch>
+            <a:fillRect/>
+          </a:stretch>
+        </p:blipFill>
+        <p:spPr>
+          <a:xfrm>
+            <a:off x="0" y="5232400"/>
+            <a:ext cx="12192000" cy="1625600"/>
+          </a:xfrm>
+          <a:prstGeom prst="rect">
+            <a:avLst/>
+          </a:prstGeom>
+        </p:spPr>
+      </p:pic>
+    </p:spTree>
+    <p:extLst>
+      <p:ext uri="{BB962C8B-B14F-4D97-AF65-F5344CB8AC3E}">
+        <p14:creationId xmlns:p14="http://schemas.microsoft.com/office/powerpoint/2010/main" val="1199733235"/>
+      </p:ext>
+    </p:extLst>
+  </p:cSld>
+  <p:clrMapOvr>
+    <a:masterClrMapping/>
+  </p:clrMapOvr>
+</p:sld>
+</file>
+
+<file path=ppt/slides/slide3.xml><?xml version="1.0" encoding="utf-8"?>
+<p:sld xmlns:a="http://schemas.openxmlformats.org/drawingml/2006/main" xmlns:r="http://schemas.openxmlformats.org/officeDocument/2006/relationships" xmlns:p="http://schemas.openxmlformats.org/presentationml/2006/main">
+  <p:cSld>
+    <p:spTree>
+      <p:nvGrpSpPr>
+        <p:cNvPr id="1" name=""/>
+        <p:cNvGrpSpPr/>
+        <p:nvPr/>
+      </p:nvGrpSpPr>
+      <p:grpSpPr>
+        <a:xfrm>
+          <a:off x="0" y="0"/>
+          <a:ext cx="0" cy="0"/>
+          <a:chOff x="0" y="0"/>
+          <a:chExt cx="0" cy="0"/>
+        </a:xfrm>
+      </p:grpSpPr>
+      <p:sp>
+        <p:nvSpPr>
+          <p:cNvPr id="2" name="Title 1">
+            <a:extLst>
+              <a:ext uri="{FF2B5EF4-FFF2-40B4-BE49-F238E27FC236}">
                 <a16:creationId xmlns:a16="http://schemas.microsoft.com/office/drawing/2014/main" id="{DA6F02C8-4424-4AD0-AA87-CA3DBFD8D3D3}"/>
               </a:ext>
             </a:extLst>
@@ -3592,7 +3717,7 @@
 </p:sld>
 </file>
 
-<file path=ppt/slides/slide3.xml><?xml version="1.0" encoding="utf-8"?>
+<file path=ppt/slides/slide4.xml><?xml version="1.0" encoding="utf-8"?>
 <p:sld xmlns:a="http://schemas.openxmlformats.org/drawingml/2006/main" xmlns:r="http://schemas.openxmlformats.org/officeDocument/2006/relationships" xmlns:p="http://schemas.openxmlformats.org/presentationml/2006/main">
   <p:cSld>
     <p:spTree>

</xml_diff>